<commit_message>
fix: change class diagram in presentation slide
</commit_message>
<xml_diff>
--- a/report/ITSS-FinalPresentation.pptx
+++ b/report/ITSS-FinalPresentation.pptx
@@ -14839,12 +14839,44 @@
           </a:p>
         </p:txBody>
       </p:sp>
+      <p:sp>
+        <p:nvSpPr>
+          <p:cNvPr id="4" name="TextBox 3">
+            <a:extLst>
+              <a:ext uri="{FF2B5EF4-FFF2-40B4-BE49-F238E27FC236}">
+                <a16:creationId xmlns:a16="http://schemas.microsoft.com/office/drawing/2014/main" id="{4F265331-FB0A-670B-A4E4-9E9C4EF76547}"/>
+              </a:ext>
+            </a:extLst>
+          </p:cNvPr>
+          <p:cNvSpPr txBox="1"/>
+          <p:nvPr/>
+        </p:nvSpPr>
+        <p:spPr>
+          <a:xfrm>
+            <a:off x="3033713" y="3244334"/>
+            <a:ext cx="6105524" cy="369332"/>
+          </a:xfrm>
+          <a:prstGeom prst="rect">
+            <a:avLst/>
+          </a:prstGeom>
+          <a:noFill/>
+        </p:spPr>
+        <p:txBody>
+          <a:bodyPr wrap="square">
+            <a:spAutoFit/>
+          </a:bodyPr>
+          <a:lstStyle/>
+          <a:p>
+            <a:endParaRPr lang="en-US" dirty="0"/>
+          </a:p>
+        </p:txBody>
+      </p:sp>
       <p:pic>
         <p:nvPicPr>
-          <p:cNvPr id="2" name="Picture 1">
+          <p:cNvPr id="7" name="Picture 6">
             <a:extLst>
               <a:ext uri="{FF2B5EF4-FFF2-40B4-BE49-F238E27FC236}">
-                <a16:creationId xmlns:a16="http://schemas.microsoft.com/office/drawing/2014/main" id="{C1BFE8A9-DF11-EAB2-8282-E786159327CD}"/>
+                <a16:creationId xmlns:a16="http://schemas.microsoft.com/office/drawing/2014/main" id="{E9784D08-522D-C0C1-1802-F68E94DED035}"/>
               </a:ext>
             </a:extLst>
           </p:cNvPr>
@@ -14861,8 +14893,8 @@
         </p:blipFill>
         <p:spPr>
           <a:xfrm>
-            <a:off x="571127" y="1455222"/>
-            <a:ext cx="11049745" cy="5083690"/>
+            <a:off x="328613" y="1231936"/>
+            <a:ext cx="11534774" cy="5516289"/>
           </a:xfrm>
           <a:prstGeom prst="rect">
             <a:avLst/>
@@ -15016,10 +15048,10 @@
       </p:sp>
       <p:pic>
         <p:nvPicPr>
-          <p:cNvPr id="3" name="Picture 2">
+          <p:cNvPr id="4" name="Picture 3">
             <a:extLst>
               <a:ext uri="{FF2B5EF4-FFF2-40B4-BE49-F238E27FC236}">
-                <a16:creationId xmlns:a16="http://schemas.microsoft.com/office/drawing/2014/main" id="{65A8FD52-A1AA-2899-6609-C60DDC27DE52}"/>
+                <a16:creationId xmlns:a16="http://schemas.microsoft.com/office/drawing/2014/main" id="{0E66FA03-B945-9DD6-8DC6-330DCD2B2DA3}"/>
               </a:ext>
             </a:extLst>
           </p:cNvPr>
@@ -15036,8 +15068,8 @@
         </p:blipFill>
         <p:spPr>
           <a:xfrm>
-            <a:off x="495300" y="2133325"/>
-            <a:ext cx="11398380" cy="2914925"/>
+            <a:off x="-9564" y="1847851"/>
+            <a:ext cx="12201564" cy="3914774"/>
           </a:xfrm>
           <a:prstGeom prst="rect">
             <a:avLst/>
@@ -24453,10 +24485,10 @@
       </p:sp>
       <p:pic>
         <p:nvPicPr>
-          <p:cNvPr id="3" name="Picture 2">
+          <p:cNvPr id="7" name="Picture 6">
             <a:extLst>
               <a:ext uri="{FF2B5EF4-FFF2-40B4-BE49-F238E27FC236}">
-                <a16:creationId xmlns:a16="http://schemas.microsoft.com/office/drawing/2014/main" id="{7B1B2FC5-47FE-C6E0-01AE-1A69AD5DFC9B}"/>
+                <a16:creationId xmlns:a16="http://schemas.microsoft.com/office/drawing/2014/main" id="{55D20AFF-0949-03B5-7AA8-9DD45D511D3D}"/>
               </a:ext>
             </a:extLst>
           </p:cNvPr>
@@ -24473,8 +24505,8 @@
         </p:blipFill>
         <p:spPr>
           <a:xfrm>
-            <a:off x="221683" y="1231936"/>
-            <a:ext cx="11585897" cy="5124414"/>
+            <a:off x="0" y="1158861"/>
+            <a:ext cx="12192000" cy="5275542"/>
           </a:xfrm>
           <a:prstGeom prst="rect">
             <a:avLst/>
@@ -24991,6 +25023,15 @@
 </file>
 
 <file path=customXml/item1.xml><?xml version="1.0" encoding="utf-8"?>
+<p:properties xmlns:p="http://schemas.microsoft.com/office/2006/metadata/properties" xmlns:xsi="http://www.w3.org/2001/XMLSchema-instance" xmlns:pc="http://schemas.microsoft.com/office/infopath/2007/PartnerControls">
+  <documentManagement>
+    <Status xmlns="71af3243-3dd4-4a8d-8c0d-dd76da1f02a5">Not started</Status>
+    <MediaServiceKeyPoints xmlns="71af3243-3dd4-4a8d-8c0d-dd76da1f02a5" xsi:nil="true"/>
+  </documentManagement>
+</p:properties>
+</file>
+
+<file path=customXml/item2.xml><?xml version="1.0" encoding="utf-8"?>
 <ct:contentTypeSchema xmlns:ct="http://schemas.microsoft.com/office/2006/metadata/contentType" xmlns:ma="http://schemas.microsoft.com/office/2006/metadata/properties/metaAttributes" ct:_="" ma:_="" ma:contentTypeName="Document" ma:contentTypeID="0x01010079F111ED35F8CC479449609E8A0923A6" ma:contentTypeVersion="12" ma:contentTypeDescription="Create a new document." ma:contentTypeScope="" ma:versionID="426e97fa315356fffbdcd9876fe988c2">
   <xsd:schema xmlns:xsd="http://www.w3.org/2001/XMLSchema" xmlns:xs="http://www.w3.org/2001/XMLSchema" xmlns:p="http://schemas.microsoft.com/office/2006/metadata/properties" xmlns:ns2="71af3243-3dd4-4a8d-8c0d-dd76da1f02a5" xmlns:ns3="16c05727-aa75-4e4a-9b5f-8a80a1165891" targetNamespace="http://schemas.microsoft.com/office/2006/metadata/properties" ma:root="true" ma:fieldsID="14b8f0def80e6d70ce3def20c90759ae" ns2:_="" ns3:_="">
     <xsd:import namespace="71af3243-3dd4-4a8d-8c0d-dd76da1f02a5"/>
@@ -25211,15 +25252,6 @@
 </ct:contentTypeSchema>
 </file>
 
-<file path=customXml/item2.xml><?xml version="1.0" encoding="utf-8"?>
-<p:properties xmlns:p="http://schemas.microsoft.com/office/2006/metadata/properties" xmlns:xsi="http://www.w3.org/2001/XMLSchema-instance" xmlns:pc="http://schemas.microsoft.com/office/infopath/2007/PartnerControls">
-  <documentManagement>
-    <Status xmlns="71af3243-3dd4-4a8d-8c0d-dd76da1f02a5">Not started</Status>
-    <MediaServiceKeyPoints xmlns="71af3243-3dd4-4a8d-8c0d-dd76da1f02a5" xsi:nil="true"/>
-  </documentManagement>
-</p:properties>
-</file>
-
 <file path=customXml/item3.xml><?xml version="1.0" encoding="utf-8"?>
 <?mso-contentType ?>
 <FormTemplates xmlns="http://schemas.microsoft.com/sharepoint/v3/contenttype/forms">
@@ -25230,6 +25262,16 @@
 </file>
 
 <file path=customXml/itemProps1.xml><?xml version="1.0" encoding="utf-8"?>
+<ds:datastoreItem xmlns:ds="http://schemas.openxmlformats.org/officeDocument/2006/customXml" ds:itemID="{99919F73-B6C2-4A43-95E2-833EC48925FE}">
+  <ds:schemaRefs>
+    <ds:schemaRef ds:uri="http://schemas.microsoft.com/office/2006/metadata/properties"/>
+    <ds:schemaRef ds:uri="http://schemas.microsoft.com/office/infopath/2007/PartnerControls"/>
+    <ds:schemaRef ds:uri="71af3243-3dd4-4a8d-8c0d-dd76da1f02a5"/>
+  </ds:schemaRefs>
+</ds:datastoreItem>
+</file>
+
+<file path=customXml/itemProps2.xml><?xml version="1.0" encoding="utf-8"?>
 <ds:datastoreItem xmlns:ds="http://schemas.openxmlformats.org/officeDocument/2006/customXml" ds:itemID="{ABC329F5-30EE-4BF7-AA2A-B837B51416B4}">
   <ds:schemaRefs>
     <ds:schemaRef ds:uri="http://schemas.microsoft.com/office/2006/metadata/contentType"/>
@@ -25248,16 +25290,6 @@
 </ds:datastoreItem>
 </file>
 
-<file path=customXml/itemProps2.xml><?xml version="1.0" encoding="utf-8"?>
-<ds:datastoreItem xmlns:ds="http://schemas.openxmlformats.org/officeDocument/2006/customXml" ds:itemID="{99919F73-B6C2-4A43-95E2-833EC48925FE}">
-  <ds:schemaRefs>
-    <ds:schemaRef ds:uri="http://schemas.microsoft.com/office/2006/metadata/properties"/>
-    <ds:schemaRef ds:uri="http://schemas.microsoft.com/office/infopath/2007/PartnerControls"/>
-    <ds:schemaRef ds:uri="71af3243-3dd4-4a8d-8c0d-dd76da1f02a5"/>
-  </ds:schemaRefs>
-</ds:datastoreItem>
-</file>
-
 <file path=customXml/itemProps3.xml><?xml version="1.0" encoding="utf-8"?>
 <ds:datastoreItem xmlns:ds="http://schemas.openxmlformats.org/officeDocument/2006/customXml" ds:itemID="{3C8E00D1-8EA3-4E42-801D-0253E1EAFC21}">
   <ds:schemaRefs>

</xml_diff>